<commit_message>
Update Project Detailed Presentation.pptx
</commit_message>
<xml_diff>
--- a/docs/ppt/Project Detailed Presentation.pptx
+++ b/docs/ppt/Project Detailed Presentation.pptx
@@ -125,10 +125,13 @@
 <file path=ppt/revisionInfo.xml><?xml version="1.0" encoding="utf-8"?>
 <p1510:revInfo xmlns:a="http://schemas.openxmlformats.org/drawingml/2006/main" xmlns:r="http://schemas.openxmlformats.org/officeDocument/2006/relationships" xmlns:p1510="http://schemas.microsoft.com/office/powerpoint/2015/10/main">
   <p1510:revLst>
-    <p1510:client id="{17BBAB3E-CC8E-314C-BEA1-DD1C8CAC323D}" v="84" dt="2022-02-01T03:55:43.879"/>
+    <p1510:client id="{114AEDA9-8134-4C39-A21A-488A1E41350B}" v="5" dt="2022-02-01T04:01:29.927"/>
+    <p1510:client id="{17BBAB3E-CC8E-314C-BEA1-DD1C8CAC323D}" v="1213" dt="2022-02-01T05:27:06.199"/>
     <p1510:client id="{2AF448F2-C37F-4A2F-96C1-977E565D47AD}" v="19" dt="2022-02-01T03:42:56.004"/>
-    <p1510:client id="{6766EE4C-3F26-4A20-ABBB-AF040D4319B7}" v="86" dt="2022-02-01T03:46:10.163"/>
+    <p1510:client id="{6766EE4C-3F26-4A20-ABBB-AF040D4319B7}" v="133" vWet="138" dt="2022-02-01T05:25:34.155"/>
+    <p1510:client id="{699B5B11-056C-47B9-AC69-2FF59F712316}" v="111" dt="2022-02-01T04:27:13.982"/>
     <p1510:client id="{71CF04A3-27DE-4564-9725-F7655C873AC0}" v="5" dt="2022-01-31T20:48:14.780"/>
+    <p1510:client id="{8A5E10DB-2DB1-4AF1-9430-3A869A2E9D9E}" v="9" dt="2022-02-01T04:47:11.062"/>
     <p1510:client id="{9C8A1E4F-11AD-4AE6-B15C-49BC080B9D73}" v="2" dt="2022-02-01T03:27:00.511"/>
     <p1510:client id="{C24C66ED-BC96-4C3D-8567-BDD62F2F5DD9}" v="4" dt="2022-02-01T03:43:07.888"/>
     <p1510:client id="{C4244D03-3BCD-4FF2-AD26-84B916B4EBC4}" v="2" dt="2022-01-31T20:45:58.922"/>
@@ -1485,12 +1488,12 @@
         <a:fontRef idx="minor"/>
       </dsp:style>
       <dsp:txBody>
-        <a:bodyPr spcFirstLastPara="0" vert="horz" wrap="square" lIns="129540" tIns="129540" rIns="129540" bIns="129540" numCol="1" spcCol="1270" anchor="t" anchorCtr="0">
+        <a:bodyPr spcFirstLastPara="0" vert="horz" wrap="square" lIns="148590" tIns="148590" rIns="148590" bIns="148590" numCol="1" spcCol="1270" anchor="t" anchorCtr="0">
           <a:noAutofit/>
         </a:bodyPr>
         <a:lstStyle/>
         <a:p>
-          <a:pPr marL="0" lvl="0" indent="0" algn="l" defTabSz="1511300">
+          <a:pPr marL="0" lvl="0" indent="0" algn="l" defTabSz="1733550">
             <a:lnSpc>
               <a:spcPct val="90000"/>
             </a:lnSpc>
@@ -1503,7 +1506,7 @@
             <a:buNone/>
           </a:pPr>
           <a:r>
-            <a:rPr lang="en-US" sz="3400" kern="1200">
+            <a:rPr lang="en-US" sz="3900" kern="1200">
               <a:latin typeface=""/>
             </a:rPr>
             <a:t>Problem Description</a:t>
@@ -1597,12 +1600,12 @@
         <a:fontRef idx="minor"/>
       </dsp:style>
       <dsp:txBody>
-        <a:bodyPr spcFirstLastPara="0" vert="horz" wrap="square" lIns="129540" tIns="129540" rIns="129540" bIns="129540" numCol="1" spcCol="1270" anchor="t" anchorCtr="0">
+        <a:bodyPr spcFirstLastPara="0" vert="horz" wrap="square" lIns="148590" tIns="148590" rIns="148590" bIns="148590" numCol="1" spcCol="1270" anchor="t" anchorCtr="0">
           <a:noAutofit/>
         </a:bodyPr>
         <a:lstStyle/>
         <a:p>
-          <a:pPr marL="0" lvl="0" indent="0" algn="l" defTabSz="1511300">
+          <a:pPr marL="0" lvl="0" indent="0" algn="l" defTabSz="1733550">
             <a:lnSpc>
               <a:spcPct val="90000"/>
             </a:lnSpc>
@@ -1615,7 +1618,7 @@
             <a:buNone/>
           </a:pPr>
           <a:r>
-            <a:rPr lang="en-US" sz="3400" kern="1200">
+            <a:rPr lang="en-US" sz="3900" kern="1200">
               <a:latin typeface=""/>
             </a:rPr>
             <a:t>Solution Description</a:t>
@@ -1709,12 +1712,12 @@
         <a:fontRef idx="minor"/>
       </dsp:style>
       <dsp:txBody>
-        <a:bodyPr spcFirstLastPara="0" vert="horz" wrap="square" lIns="129540" tIns="129540" rIns="129540" bIns="129540" numCol="1" spcCol="1270" anchor="t" anchorCtr="0">
+        <a:bodyPr spcFirstLastPara="0" vert="horz" wrap="square" lIns="148590" tIns="148590" rIns="148590" bIns="148590" numCol="1" spcCol="1270" anchor="t" anchorCtr="0">
           <a:noAutofit/>
         </a:bodyPr>
         <a:lstStyle/>
         <a:p>
-          <a:pPr marL="0" lvl="0" indent="0" algn="l" defTabSz="1511300" rtl="0">
+          <a:pPr marL="0" lvl="0" indent="0" algn="l" defTabSz="1733550" rtl="0">
             <a:lnSpc>
               <a:spcPct val="90000"/>
             </a:lnSpc>
@@ -1727,7 +1730,7 @@
             <a:buNone/>
           </a:pPr>
           <a:r>
-            <a:rPr lang="en-US" sz="3400" kern="1200">
+            <a:rPr lang="en-US" sz="3900" kern="1200">
               <a:latin typeface=""/>
             </a:rPr>
             <a:t>Project Scope and evaluation</a:t>
@@ -1821,12 +1824,12 @@
         <a:fontRef idx="minor"/>
       </dsp:style>
       <dsp:txBody>
-        <a:bodyPr spcFirstLastPara="0" vert="horz" wrap="square" lIns="129540" tIns="129540" rIns="129540" bIns="129540" numCol="1" spcCol="1270" anchor="t" anchorCtr="0">
+        <a:bodyPr spcFirstLastPara="0" vert="horz" wrap="square" lIns="148590" tIns="148590" rIns="148590" bIns="148590" numCol="1" spcCol="1270" anchor="t" anchorCtr="0">
           <a:noAutofit/>
         </a:bodyPr>
         <a:lstStyle/>
         <a:p>
-          <a:pPr marL="0" lvl="0" indent="0" algn="l" defTabSz="1511300">
+          <a:pPr marL="0" lvl="0" indent="0" algn="l" defTabSz="1733550">
             <a:lnSpc>
               <a:spcPct val="90000"/>
             </a:lnSpc>
@@ -1839,7 +1842,7 @@
             <a:buNone/>
           </a:pPr>
           <a:r>
-            <a:rPr lang="en-US" sz="3400" kern="1200">
+            <a:rPr lang="en-US" sz="3900" kern="1200">
               <a:latin typeface=""/>
             </a:rPr>
             <a:t>Technologies</a:t>
@@ -1933,12 +1936,12 @@
         <a:fontRef idx="minor"/>
       </dsp:style>
       <dsp:txBody>
-        <a:bodyPr spcFirstLastPara="0" vert="horz" wrap="square" lIns="129540" tIns="129540" rIns="129540" bIns="129540" numCol="1" spcCol="1270" anchor="t" anchorCtr="0">
+        <a:bodyPr spcFirstLastPara="0" vert="horz" wrap="square" lIns="148590" tIns="148590" rIns="148590" bIns="148590" numCol="1" spcCol="1270" anchor="t" anchorCtr="0">
           <a:noAutofit/>
         </a:bodyPr>
         <a:lstStyle/>
         <a:p>
-          <a:pPr marL="0" lvl="0" indent="0" algn="l" defTabSz="1511300" rtl="0">
+          <a:pPr marL="0" lvl="0" indent="0" algn="l" defTabSz="1733550" rtl="0">
             <a:lnSpc>
               <a:spcPct val="90000"/>
             </a:lnSpc>
@@ -1951,7 +1954,7 @@
             <a:buNone/>
           </a:pPr>
           <a:r>
-            <a:rPr lang="en-US" sz="3400" kern="1200">
+            <a:rPr lang="en-US" sz="3900" kern="1200">
               <a:latin typeface=""/>
             </a:rPr>
             <a:t>Project usecases</a:t>
@@ -8985,7 +8988,7 @@
                 <a:latin typeface=""/>
                 <a:cs typeface="Calibri Light"/>
               </a:rPr>
-              <a:t>Problem Description - AP</a:t>
+              <a:t>Problem Description</a:t>
             </a:r>
             <a:endParaRPr lang="en-US" sz="3600" b="1">
               <a:latin typeface=""/>
@@ -9025,7 +9028,7 @@
               <a:buNone/>
             </a:pPr>
             <a:r>
-              <a:rPr lang="en-CA" sz="2400" b="1">
+              <a:rPr lang="en-CA" sz="2400" b="1" dirty="0">
                 <a:solidFill>
                   <a:srgbClr val="0070C0"/>
                 </a:solidFill>
@@ -9039,7 +9042,7 @@
               <a:buNone/>
             </a:pPr>
             <a:r>
-              <a:rPr lang="en-US" sz="2400">
+              <a:rPr lang="en-US" sz="2400" dirty="0">
                 <a:ea typeface="+mn-lt"/>
                 <a:cs typeface="+mn-lt"/>
               </a:rPr>
@@ -9051,7 +9054,7 @@
               <a:buNone/>
             </a:pPr>
             <a:r>
-              <a:rPr lang="en-US" sz="2400">
+              <a:rPr lang="en-US" sz="2400" dirty="0">
                 <a:ea typeface="+mn-lt"/>
                 <a:cs typeface="+mn-lt"/>
               </a:rPr>
@@ -9063,7 +9066,7 @@
               <a:buNone/>
             </a:pPr>
             <a:r>
-              <a:rPr lang="en-US" sz="2500" b="1">
+              <a:rPr lang="en-US" sz="2500" b="1" dirty="0">
                 <a:ea typeface="+mn-lt"/>
                 <a:cs typeface="+mn-lt"/>
               </a:rPr>
@@ -9075,7 +9078,7 @@
               <a:buNone/>
             </a:pPr>
             <a:r>
-              <a:rPr lang="en-US" sz="2400">
+              <a:rPr lang="en-US" sz="2400" dirty="0">
                 <a:ea typeface="+mn-lt"/>
                 <a:cs typeface="+mn-lt"/>
               </a:rPr>
@@ -9087,7 +9090,7 @@
               <a:buNone/>
             </a:pPr>
             <a:r>
-              <a:rPr lang="en-US" sz="2500" b="1">
+              <a:rPr lang="en-US" sz="2500" b="1" dirty="0">
                 <a:ea typeface="+mn-lt"/>
                 <a:cs typeface="+mn-lt"/>
               </a:rPr>
@@ -9099,13 +9102,13 @@
               <a:buNone/>
             </a:pPr>
             <a:r>
-              <a:rPr lang="en-US" sz="2400">
+              <a:rPr lang="en-US" sz="2400" dirty="0">
                 <a:ea typeface="+mn-lt"/>
                 <a:cs typeface="+mn-lt"/>
               </a:rPr>
               <a:t>On both desktop and mobile, the game may be played in the Chrome browser. The control is the simplest: When the black dinosaur appears in our browser, suggesting that there is no Internet connection, we just hit the spacebar to begin the game. Jumping over obstacles is also done with the spacebar. To duck, use the down arrow. If we're on a mobile device, simply tapping the little Chrome Dino will activate it and help it avoid obstacles.</a:t>
             </a:r>
-            <a:endParaRPr lang="en-CA" sz="2400" b="1">
+            <a:endParaRPr lang="en-CA" sz="2400" b="1" dirty="0">
               <a:ea typeface="+mn-lt"/>
               <a:cs typeface="+mn-lt"/>
             </a:endParaRPr>
@@ -9115,39 +9118,31 @@
               <a:buNone/>
             </a:pPr>
             <a:r>
-              <a:rPr lang="en-CA" sz="2400" b="1">
+              <a:rPr lang="en-CA" sz="2400" b="1" dirty="0">
                 <a:solidFill>
                   <a:srgbClr val="0070C0"/>
                 </a:solidFill>
                 <a:latin typeface=""/>
               </a:rPr>
-              <a:t>Why should train this Dino?</a:t>
+              <a:t>Why should we train this Dino?</a:t>
             </a:r>
           </a:p>
           <a:p>
-            <a:pPr>
-              <a:buFontTx/>
-              <a:buChar char="-"/>
-            </a:pPr>
             <a:r>
-              <a:rPr lang="en-CA" sz="2400">
+              <a:rPr lang="en-CA" sz="2400" dirty="0">
                 <a:cs typeface="Calibri"/>
               </a:rPr>
               <a:t>If we are trying to create AI, why not try to see how these algorithms perform at playing games? Games can be learnt from scratch – with usually a simple goal (of survival in this case).</a:t>
             </a:r>
           </a:p>
           <a:p>
-            <a:pPr>
-              <a:buFontTx/>
-              <a:buChar char="-"/>
-            </a:pPr>
             <a:r>
-              <a:rPr lang="en-US" sz="2400">
+              <a:rPr lang="en-US" sz="2400" dirty="0">
                 <a:cs typeface="Calibri"/>
               </a:rPr>
               <a:t>Training a virtual agent to outperform human players can teach us how to optimize different processes in a variety of different and exciting subfields. By better understanding different aspects of intelligence, we can use this knowledge as inspiration to build novel computer systems that learn to find solutions to difficult problems on their own.</a:t>
             </a:r>
-            <a:endParaRPr lang="en-CA" sz="2400">
+            <a:endParaRPr lang="en-CA" sz="2400" dirty="0">
               <a:cs typeface="Calibri"/>
             </a:endParaRPr>
           </a:p>
@@ -9702,35 +9697,27 @@
         </p:nvSpPr>
         <p:spPr>
           <a:xfrm>
-            <a:off x="838200" y="1688215"/>
-            <a:ext cx="10515600" cy="4351338"/>
+            <a:off x="838200" y="1688214"/>
+            <a:ext cx="10515600" cy="4513732"/>
           </a:xfrm>
         </p:spPr>
         <p:txBody>
           <a:bodyPr vert="horz" lIns="91440" tIns="45720" rIns="91440" bIns="45720" rtlCol="0" anchor="t">
-            <a:normAutofit fontScale="55000" lnSpcReduction="20000"/>
+            <a:normAutofit fontScale="62500" lnSpcReduction="20000"/>
           </a:bodyPr>
           <a:lstStyle/>
           <a:p>
-            <a:pPr>
-              <a:buFontTx/>
-              <a:buChar char="-"/>
-            </a:pPr>
             <a:r>
-              <a:rPr lang="en-US">
+              <a:rPr lang="en-US" dirty="0">
                 <a:latin typeface=""/>
                 <a:cs typeface="Calibri"/>
               </a:rPr>
-              <a:t>Use of reinforcement algorithm</a:t>
+              <a:t>Use of Reinforcement Algorithm</a:t>
             </a:r>
           </a:p>
           <a:p>
-            <a:pPr>
-              <a:buFontTx/>
-              <a:buChar char="-"/>
-            </a:pPr>
             <a:r>
-              <a:rPr lang="en-US">
+              <a:rPr lang="en-US" dirty="0">
                 <a:latin typeface=""/>
                 <a:ea typeface="+mn-lt"/>
                 <a:cs typeface="+mn-lt"/>
@@ -9742,7 +9729,7 @@
             <a:pPr marL="0" indent="0">
               <a:buNone/>
             </a:pPr>
-            <a:endParaRPr lang="en-US" b="1">
+            <a:endParaRPr lang="en-US" b="1" dirty="0">
               <a:latin typeface=""/>
               <a:ea typeface="+mn-lt"/>
               <a:cs typeface="+mn-lt"/>
@@ -9753,7 +9740,7 @@
               <a:buNone/>
             </a:pPr>
             <a:r>
-              <a:rPr lang="en-US" b="1">
+              <a:rPr lang="en-US" b="1" dirty="0">
                 <a:solidFill>
                   <a:srgbClr val="0070C0"/>
                 </a:solidFill>
@@ -9765,37 +9752,26 @@
             </a:r>
           </a:p>
           <a:p>
-            <a:pPr marL="0" indent="0">
-              <a:buNone/>
-            </a:pPr>
             <a:r>
-              <a:rPr lang="en-US">
+              <a:rPr lang="en-US" dirty="0">
                 <a:latin typeface=""/>
                 <a:cs typeface="Calibri"/>
               </a:rPr>
-              <a:t>-   The algorithm would describe a high-level overview of the steps to be undertaken.</a:t>
+              <a:t>The algorithm would describe a high-level overview of the steps to be undertaken.</a:t>
             </a:r>
           </a:p>
           <a:p>
-            <a:pPr>
-              <a:buFontTx/>
-              <a:buChar char="-"/>
-            </a:pPr>
             <a:r>
-              <a:rPr lang="en-US">
+              <a:rPr lang="en-US" dirty="0">
                 <a:latin typeface=""/>
                 <a:cs typeface="Calibri"/>
               </a:rPr>
-              <a:t>Achieving the current position of the Dino in the game.</a:t>
+              <a:t>Achieve the live position of the Dino in the game.</a:t>
             </a:r>
           </a:p>
           <a:p>
-            <a:pPr>
-              <a:buFontTx/>
-              <a:buChar char="-"/>
-            </a:pPr>
             <a:r>
-              <a:rPr lang="en-US">
+              <a:rPr lang="en-US" dirty="0">
                 <a:latin typeface=""/>
                 <a:cs typeface="Calibri"/>
               </a:rPr>
@@ -9803,36 +9779,28 @@
             </a:r>
           </a:p>
           <a:p>
-            <a:pPr>
-              <a:buFontTx/>
-              <a:buChar char="-"/>
-            </a:pPr>
             <a:r>
-              <a:rPr lang="en-US">
+              <a:rPr lang="en-US" dirty="0">
                 <a:latin typeface=""/>
                 <a:cs typeface="Calibri"/>
               </a:rPr>
-              <a:t>Q-Learning Reinforcement learning algorithm to be used.</a:t>
+              <a:t>Q-Learning Reinforcement learning algorithm is to be used.</a:t>
             </a:r>
           </a:p>
           <a:p>
-            <a:pPr>
-              <a:buFontTx/>
-              <a:buChar char="-"/>
-            </a:pPr>
             <a:r>
-              <a:rPr lang="en-US">
+              <a:rPr lang="en-US" dirty="0">
                 <a:latin typeface=""/>
                 <a:cs typeface="Calibri"/>
               </a:rPr>
-              <a:t>How is the model going to be trained?</a:t>
+              <a:t>The way the model is going to be trained.</a:t>
             </a:r>
           </a:p>
           <a:p>
             <a:pPr marL="0" indent="0">
               <a:buNone/>
             </a:pPr>
-            <a:endParaRPr lang="en-US" b="1">
+            <a:endParaRPr lang="en-US" b="1" dirty="0">
               <a:latin typeface=""/>
               <a:cs typeface="Calibri"/>
             </a:endParaRPr>
@@ -9842,7 +9810,7 @@
               <a:buNone/>
             </a:pPr>
             <a:r>
-              <a:rPr lang="en-US" b="1">
+              <a:rPr lang="en-US" b="1" dirty="0">
                 <a:solidFill>
                   <a:srgbClr val="0070C0"/>
                 </a:solidFill>
@@ -9854,30 +9822,36 @@
           </a:p>
           <a:p>
             <a:r>
-              <a:rPr lang="en-US">
+              <a:rPr lang="en-US" dirty="0">
                 <a:latin typeface=""/>
                 <a:cs typeface="Calibri"/>
               </a:rPr>
-              <a:t>Two ways to use cloud computing for the project</a:t>
+              <a:t>Two ways to use cloud computing for the project.</a:t>
             </a:r>
           </a:p>
           <a:p>
             <a:r>
-              <a:rPr lang="en-US">
+              <a:rPr lang="en-US" dirty="0">
                 <a:latin typeface=""/>
                 <a:cs typeface="Calibri"/>
               </a:rPr>
-              <a:t>Train and test the performance of the model on the cloud – there might eb a cost associated.</a:t>
+              <a:t>Training and testing the performance of the model on the cloud – there might be a cost associated.</a:t>
             </a:r>
           </a:p>
           <a:p>
             <a:r>
-              <a:rPr lang="en-US">
+              <a:rPr lang="en-US" dirty="0">
                 <a:latin typeface=""/>
                 <a:cs typeface="Calibri"/>
               </a:rPr>
               <a:t>Create a website, a playground for hyperparameter tuning for the model.</a:t>
             </a:r>
+          </a:p>
+          <a:p>
+            <a:endParaRPr lang="en-US" dirty="0">
+              <a:latin typeface=""/>
+              <a:cs typeface="Calibri"/>
+            </a:endParaRPr>
           </a:p>
         </p:txBody>
       </p:sp>
@@ -9979,7 +9953,7 @@
               <a:buNone/>
             </a:pPr>
             <a:r>
-              <a:rPr lang="en-US" sz="2000" b="1">
+              <a:rPr lang="en-US" sz="2000" b="1" dirty="0">
                 <a:latin typeface=""/>
                 <a:cs typeface="Calibri"/>
               </a:rPr>
@@ -9990,7 +9964,7 @@
             <a:pPr marL="0" indent="0">
               <a:buNone/>
             </a:pPr>
-            <a:endParaRPr lang="en-US" sz="2400" b="1">
+            <a:endParaRPr lang="en-US" sz="2400" b="1" dirty="0">
               <a:latin typeface=""/>
               <a:cs typeface="Calibri"/>
             </a:endParaRPr>
@@ -10000,7 +9974,7 @@
               <a:buNone/>
             </a:pPr>
             <a:r>
-              <a:rPr lang="en-US" sz="2400" b="1">
+              <a:rPr lang="en-US" sz="2400" b="1" dirty="0">
                 <a:solidFill>
                   <a:srgbClr val="0070C0"/>
                 </a:solidFill>
@@ -10009,7 +9983,7 @@
               </a:rPr>
               <a:t>In-scope deliverables</a:t>
             </a:r>
-            <a:endParaRPr lang="en-US" sz="1600" b="1">
+            <a:endParaRPr lang="en-US" sz="1600" b="1" dirty="0">
               <a:solidFill>
                 <a:srgbClr val="0070C0"/>
               </a:solidFill>
@@ -10024,11 +9998,11 @@
               </a:spcAft>
             </a:pPr>
             <a:r>
-              <a:rPr lang="en-US" sz="2000">
+              <a:rPr lang="en-US" sz="2000" dirty="0">
                 <a:latin typeface=""/>
                 <a:cs typeface="Calibri"/>
               </a:rPr>
-              <a:t>A chrome extension with a simple user interface.</a:t>
+              <a:t>Prepare a plan to acquire, clean and prepare the current state of the game for the model input.</a:t>
             </a:r>
           </a:p>
           <a:p>
@@ -10038,11 +10012,11 @@
               </a:spcAft>
             </a:pPr>
             <a:r>
-              <a:rPr lang="en-US" sz="2000">
+              <a:rPr lang="en-US" sz="2000" dirty="0">
                 <a:latin typeface=""/>
                 <a:cs typeface="Calibri"/>
               </a:rPr>
-              <a:t>Acquire, clean and prepare the data for training the machine learning algorithm.</a:t>
+              <a:t>Train and test a reinforcement learning (Q-Learning) algorithm to play the game and make the highest score variable.</a:t>
             </a:r>
           </a:p>
           <a:p>
@@ -10052,32 +10026,13 @@
               </a:spcAft>
             </a:pPr>
             <a:r>
-              <a:rPr lang="en-US" sz="2000">
+              <a:rPr lang="en-US" sz="2000" dirty="0">
                 <a:latin typeface=""/>
                 <a:cs typeface="Calibri"/>
               </a:rPr>
-              <a:t>Design, build and deploy the machine learning  algorithm to successfully classify the spoiler from a text extract.</a:t>
+              <a:t>Improve the performance of the model by tuning the hyperparameters and using different network architectures.</a:t>
             </a:r>
-          </a:p>
-          <a:p>
-            <a:pPr marL="285750" indent="-285750">
-              <a:spcAft>
-                <a:spcPts val="500"/>
-              </a:spcAft>
-            </a:pPr>
-            <a:r>
-              <a:rPr lang="en-US" sz="2000">
-                <a:latin typeface=""/>
-                <a:cs typeface="Calibri"/>
-              </a:rPr>
-              <a:t>Create a prototype by integrating the machine learning model to the browser extension.</a:t>
-            </a:r>
-          </a:p>
-          <a:p>
-            <a:pPr marL="0" indent="0">
-              <a:buNone/>
-            </a:pPr>
-            <a:endParaRPr lang="en-US" sz="2400" b="1">
+            <a:endParaRPr lang="en-US" sz="2400" b="1" dirty="0">
               <a:latin typeface=""/>
               <a:cs typeface="Calibri"/>
             </a:endParaRPr>
@@ -10087,7 +10042,7 @@
               <a:buNone/>
             </a:pPr>
             <a:r>
-              <a:rPr lang="en-US" sz="2400" b="1">
+              <a:rPr lang="en-US" sz="2400" b="1" dirty="0">
                 <a:solidFill>
                   <a:srgbClr val="0070C0"/>
                 </a:solidFill>
@@ -10099,16 +10054,24 @@
           </a:p>
           <a:p>
             <a:r>
-              <a:rPr lang="en-CA" sz="2000"/>
-              <a:t>Gaining users for the extension.</a:t>
+              <a:rPr lang="en-CA" sz="2000" dirty="0"/>
+              <a:t>Creating a duplicate version of the </a:t>
             </a:r>
-          </a:p>
-          <a:p>
             <a:r>
-              <a:rPr lang="en-CA" sz="2000"/>
+              <a:rPr lang="en-CA" sz="2000" dirty="0" err="1"/>
+              <a:t>dino</a:t>
+            </a:r>
+            <a:r>
+              <a:rPr lang="en-CA" sz="2000" dirty="0"/>
+              <a:t> game as a test environment for the training and testing of the reinforcement learning model.</a:t>
+            </a:r>
+          </a:p>
+          <a:p>
+            <a:r>
+              <a:rPr lang="en-CA" sz="2000" dirty="0"/>
               <a:t>Data collection for model training.</a:t>
             </a:r>
-            <a:endParaRPr lang="en-US" sz="2000"/>
+            <a:endParaRPr lang="en-US" sz="2000" dirty="0"/>
           </a:p>
           <a:p>
             <a:pPr marL="742950" lvl="1" indent="-285750">
@@ -10118,7 +10081,7 @@
               <a:buFont typeface="Arial"/>
               <a:buChar char="•"/>
             </a:pPr>
-            <a:endParaRPr lang="en-US" sz="1600">
+            <a:endParaRPr lang="en-US" sz="1600" dirty="0">
               <a:latin typeface=""/>
               <a:cs typeface="Calibri"/>
             </a:endParaRPr>
@@ -10127,7 +10090,7 @@
             <a:pPr marL="0" indent="0">
               <a:buNone/>
             </a:pPr>
-            <a:endParaRPr lang="en-US" sz="2000">
+            <a:endParaRPr lang="en-US" sz="2000" dirty="0">
               <a:latin typeface=""/>
               <a:cs typeface="Calibri"/>
             </a:endParaRPr>
@@ -12102,14 +12065,14 @@
           <a:lstStyle/>
           <a:p>
             <a:r>
-              <a:rPr lang="en-US" sz="3600" dirty="0">
+              <a:rPr lang="en-US" sz="3600">
                 <a:latin typeface=""/>
                 <a:cs typeface="Calibri Light"/>
               </a:rPr>
               <a:t>Future Scope</a:t>
             </a:r>
             <a:br>
-              <a:rPr lang="en-US" sz="3600" dirty="0">
+              <a:rPr lang="en-US" sz="3600">
                 <a:latin typeface=""/>
                 <a:cs typeface="Calibri Light"/>
               </a:rPr>
@@ -12124,9 +12087,9 @@
                 <a:latin typeface=""/>
                 <a:cs typeface="Calibri Light"/>
               </a:rPr>
-              <a:t>Use case for the users to </a:t>
+              <a:t>Use case – Project Evaluation</a:t>
             </a:r>
-            <a:endParaRPr lang="en-US" sz="2400" dirty="0">
+            <a:endParaRPr lang="en-US" sz="2400">
               <a:solidFill>
                 <a:schemeClr val="bg1">
                   <a:lumMod val="50000"/>
@@ -12155,8 +12118,8 @@
         </p:nvSpPr>
         <p:spPr/>
         <p:txBody>
-          <a:bodyPr>
-            <a:normAutofit fontScale="70000" lnSpcReduction="20000"/>
+          <a:bodyPr vert="horz" lIns="91440" tIns="45720" rIns="91440" bIns="45720" rtlCol="0" anchor="t">
+            <a:normAutofit/>
           </a:bodyPr>
           <a:lstStyle/>
           <a:p>
@@ -12167,37 +12130,16 @@
               <a:rPr lang="en-US" sz="2400">
                 <a:latin typeface=""/>
               </a:rPr>
-              <a:t>The goal is to create a Chrome web browser extension that works in a similar way to </a:t>
+              <a:t>Deployment of the algorithm on a webpage - to allow users to tune the hyperparameters of the model.</a:t>
             </a:r>
-            <a:r>
-              <a:rPr lang="en-US" sz="2400">
-                <a:solidFill>
-                  <a:schemeClr val="bg1">
-                    <a:lumMod val="50000"/>
-                  </a:schemeClr>
-                </a:solidFill>
-                <a:latin typeface=""/>
-                <a:hlinkClick r:id="rId2">
-                  <a:extLst>
-                    <a:ext uri="{A12FA001-AC4F-418D-AE19-62706E023703}">
-                      <ahyp:hlinkClr xmlns:ahyp="http://schemas.microsoft.com/office/drawing/2018/hyperlinkcolor" val="tx"/>
-                    </a:ext>
-                  </a:extLst>
-                </a:hlinkClick>
-              </a:rPr>
-              <a:t>Spoiler Protection 2.0</a:t>
-            </a:r>
-            <a:r>
-              <a:rPr lang="en-US" sz="2400">
-                <a:solidFill>
-                  <a:schemeClr val="bg1">
-                    <a:lumMod val="50000"/>
-                  </a:schemeClr>
-                </a:solidFill>
-                <a:latin typeface=""/>
-              </a:rPr>
-              <a:t>. </a:t>
-            </a:r>
+            <a:endParaRPr lang="en-US" sz="2400">
+              <a:solidFill>
+                <a:schemeClr val="bg1">
+                  <a:lumMod val="50000"/>
+                </a:schemeClr>
+              </a:solidFill>
+              <a:latin typeface=""/>
+            </a:endParaRPr>
           </a:p>
           <a:p>
             <a:pPr marL="0" indent="0">
@@ -12214,7 +12156,7 @@
             <a:r>
               <a:rPr lang="en-US" sz="2400" b="1">
                 <a:solidFill>
-                  <a:srgbClr val="FF5757"/>
+                  <a:srgbClr val="0070C0"/>
                 </a:solidFill>
                 <a:latin typeface=""/>
               </a:rPr>
@@ -12226,51 +12168,7 @@
               <a:rPr lang="en-US" sz="2400">
                 <a:latin typeface=""/>
               </a:rPr>
-              <a:t>Ability to selected from a pre-defined list of movies. If the desired movie option does not exist, add name of the movie manually.</a:t>
-            </a:r>
-          </a:p>
-          <a:p>
-            <a:r>
-              <a:rPr lang="en-US" sz="2400">
-                <a:latin typeface=""/>
-              </a:rPr>
-              <a:t>Ability to switch between three modes:</a:t>
-            </a:r>
-          </a:p>
-          <a:p>
-            <a:pPr marL="914400" lvl="1" indent="-457200">
-              <a:buFont typeface="+mj-lt"/>
-              <a:buAutoNum type="arabicPeriod"/>
-            </a:pPr>
-            <a:r>
-              <a:rPr lang="en-US" sz="2000">
-                <a:latin typeface=""/>
-              </a:rPr>
-              <a:t>Extension OFF – Do not hide any spoilers.</a:t>
-            </a:r>
-          </a:p>
-          <a:p>
-            <a:pPr marL="914400" lvl="1" indent="-457200">
-              <a:buFont typeface="+mj-lt"/>
-              <a:buAutoNum type="arabicPeriod"/>
-            </a:pPr>
-            <a:r>
-              <a:rPr lang="en-US" sz="2000">
-                <a:latin typeface=""/>
-              </a:rPr>
-              <a:t>Hidden Mode – hide specific parts of a webpage.</a:t>
-            </a:r>
-          </a:p>
-          <a:p>
-            <a:pPr marL="914400" lvl="1" indent="-457200">
-              <a:buFont typeface="+mj-lt"/>
-              <a:buAutoNum type="arabicPeriod"/>
-            </a:pPr>
-            <a:r>
-              <a:rPr lang="en-US" sz="2000">
-                <a:latin typeface=""/>
-              </a:rPr>
-              <a:t>Pop-up Mode – have a pop-up appear when visiting a webpage with spoilers.</a:t>
+              <a:t>Ability to navigate through the obstacles and move forward. </a:t>
             </a:r>
           </a:p>
           <a:p>
@@ -12297,7 +12195,7 @@
             <a:r>
               <a:rPr lang="en-US" sz="2400" b="1">
                 <a:solidFill>
-                  <a:srgbClr val="FF5757"/>
+                  <a:srgbClr val="0070C0"/>
                 </a:solidFill>
                 <a:latin typeface=""/>
                 <a:cs typeface="Calibri"/>
@@ -12311,16 +12209,7 @@
                 <a:latin typeface=""/>
                 <a:cs typeface="Calibri"/>
               </a:rPr>
-              <a:t>Successful development of chrome extension to block spoiler text.</a:t>
-            </a:r>
-          </a:p>
-          <a:p>
-            <a:r>
-              <a:rPr lang="en-US" sz="2400">
-                <a:latin typeface=""/>
-                <a:cs typeface="Calibri"/>
-              </a:rPr>
-              <a:t>Successful development of machine learning model to classify spoiler text.</a:t>
+              <a:t>Beat the target score of 10000 points.</a:t>
             </a:r>
           </a:p>
         </p:txBody>
@@ -12360,7 +12249,7 @@
             <p:nvPr/>
           </p:nvPicPr>
           <p:blipFill>
-            <a:blip r:embed="rId3">
+            <a:blip r:embed="rId2">
               <a:extLst>
                 <a:ext uri="{28A0092B-C50C-407E-A947-70E740481C1C}">
                   <a14:useLocalDpi xmlns:a14="http://schemas.microsoft.com/office/drawing/2010/main" val="0"/>
@@ -13232,6 +13121,15 @@
 </file>
 
 <file path=customXml/item1.xml><?xml version="1.0" encoding="utf-8"?>
+<?mso-contentType ?>
+<FormTemplates xmlns="http://schemas.microsoft.com/sharepoint/v3/contenttype/forms">
+  <Display>DocumentLibraryForm</Display>
+  <Edit>DocumentLibraryForm</Edit>
+  <New>DocumentLibraryForm</New>
+</FormTemplates>
+</file>
+
+<file path=customXml/item2.xml><?xml version="1.0" encoding="utf-8"?>
 <ct:contentTypeSchema xmlns:ct="http://schemas.microsoft.com/office/2006/metadata/contentType" xmlns:ma="http://schemas.microsoft.com/office/2006/metadata/properties/metaAttributes" ct:_="" ma:_="" ma:contentTypeName="Document" ma:contentTypeID="0x010100291CC0CE335B6E4281FE89842D256374" ma:contentTypeVersion="12" ma:contentTypeDescription="Create a new document." ma:contentTypeScope="" ma:versionID="ae9d638fc8612f104d9c94ad5ab6c34d">
   <xsd:schema xmlns:xsd="http://www.w3.org/2001/XMLSchema" xmlns:xs="http://www.w3.org/2001/XMLSchema" xmlns:p="http://schemas.microsoft.com/office/2006/metadata/properties" xmlns:ns2="1a303891-b730-4f3b-97a3-ea9f42070766" xmlns:ns3="7a701bdc-cd9f-45d4-a0d4-25a2b20bd704" targetNamespace="http://schemas.microsoft.com/office/2006/metadata/properties" ma:root="true" ma:fieldsID="2221c7a9a8d3215347c3a6ee65086457" ns2:_="" ns3:_="">
     <xsd:import namespace="1a303891-b730-4f3b-97a3-ea9f42070766"/>
@@ -13448,22 +13346,21 @@
 </ct:contentTypeSchema>
 </file>
 
-<file path=customXml/item2.xml><?xml version="1.0" encoding="utf-8"?>
+<file path=customXml/item3.xml><?xml version="1.0" encoding="utf-8"?>
 <p:properties xmlns:p="http://schemas.microsoft.com/office/2006/metadata/properties" xmlns:xsi="http://www.w3.org/2001/XMLSchema-instance" xmlns:pc="http://schemas.microsoft.com/office/infopath/2007/PartnerControls">
   <documentManagement/>
 </p:properties>
 </file>
 
-<file path=customXml/item3.xml><?xml version="1.0" encoding="utf-8"?>
-<?mso-contentType ?>
-<FormTemplates xmlns="http://schemas.microsoft.com/sharepoint/v3/contenttype/forms">
-  <Display>DocumentLibraryForm</Display>
-  <Edit>DocumentLibraryForm</Edit>
-  <New>DocumentLibraryForm</New>
-</FormTemplates>
+<file path=customXml/itemProps1.xml><?xml version="1.0" encoding="utf-8"?>
+<ds:datastoreItem xmlns:ds="http://schemas.openxmlformats.org/officeDocument/2006/customXml" ds:itemID="{61430105-7A75-42AB-ABF8-2AA674738A32}">
+  <ds:schemaRefs>
+    <ds:schemaRef ds:uri="http://schemas.microsoft.com/sharepoint/v3/contenttype/forms"/>
+  </ds:schemaRefs>
+</ds:datastoreItem>
 </file>
 
-<file path=customXml/itemProps1.xml><?xml version="1.0" encoding="utf-8"?>
+<file path=customXml/itemProps2.xml><?xml version="1.0" encoding="utf-8"?>
 <ds:datastoreItem xmlns:ds="http://schemas.openxmlformats.org/officeDocument/2006/customXml" ds:itemID="{F7F90BF9-4E57-46AB-8B64-A3AAEE8B040C}">
   <ds:schemaRefs>
     <ds:schemaRef ds:uri="1a303891-b730-4f3b-97a3-ea9f42070766"/>
@@ -13482,7 +13379,7 @@
 </ds:datastoreItem>
 </file>
 
-<file path=customXml/itemProps2.xml><?xml version="1.0" encoding="utf-8"?>
+<file path=customXml/itemProps3.xml><?xml version="1.0" encoding="utf-8"?>
 <ds:datastoreItem xmlns:ds="http://schemas.openxmlformats.org/officeDocument/2006/customXml" ds:itemID="{8F67229A-346B-431C-9475-F7EC9532EF5A}">
   <ds:schemaRefs>
     <ds:schemaRef ds:uri="1a303891-b730-4f3b-97a3-ea9f42070766"/>
@@ -13497,12 +13394,4 @@
     <ds:schemaRef ds:uri="http://www.w3.org/XML/1998/namespace"/>
   </ds:schemaRefs>
 </ds:datastoreItem>
-</file>
-
-<file path=customXml/itemProps3.xml><?xml version="1.0" encoding="utf-8"?>
-<ds:datastoreItem xmlns:ds="http://schemas.openxmlformats.org/officeDocument/2006/customXml" ds:itemID="{61430105-7A75-42AB-ABF8-2AA674738A32}">
-  <ds:schemaRefs>
-    <ds:schemaRef ds:uri="http://schemas.microsoft.com/sharepoint/v3/contenttype/forms"/>
-  </ds:schemaRefs>
-</ds:datastoreItem>
 </file>
</xml_diff>